<commit_message>
Rajout exercices 2 (visibilité)
</commit_message>
<xml_diff>
--- a/Diagramme de classe/L2 - Méthodes et visibilité/L2 - Méthodes et visibilité.pptx
+++ b/Diagramme de classe/L2 - Méthodes et visibilité/L2 - Méthodes et visibilité.pptx
@@ -5,7 +5,7 @@
     <p:sldMasterId id="2147483648" r:id="rId1"/>
   </p:sldMasterIdLst>
   <p:notesMasterIdLst>
-    <p:notesMasterId r:id="rId7"/>
+    <p:notesMasterId r:id="rId8"/>
   </p:notesMasterIdLst>
   <p:sldIdLst>
     <p:sldId id="256" r:id="rId2"/>
@@ -13,6 +13,7 @@
     <p:sldId id="261" r:id="rId4"/>
     <p:sldId id="262" r:id="rId5"/>
     <p:sldId id="263" r:id="rId6"/>
+    <p:sldId id="264" r:id="rId7"/>
   </p:sldIdLst>
   <p:sldSz cx="9144000" cy="6858000" type="screen4x3"/>
   <p:notesSz cx="6858000" cy="9144000"/>
@@ -196,7 +197,8 @@
           <a:p>
             <a:fld id="{A25623AB-641E-4BE5-8BB8-E9ECD9F62C0A}" type="datetimeFigureOut">
               <a:rPr lang="fr-FR" smtClean="0"/>
-              <a:t>24/01/2014</a:t>
+              <a:pPr/>
+              <a:t>27/01/2014</a:t>
             </a:fld>
             <a:endParaRPr lang="fr-CH"/>
           </a:p>
@@ -357,6 +359,7 @@
           <a:p>
             <a:fld id="{1DCE5F11-534C-45A7-8A38-E52E47A254FF}" type="slidenum">
               <a:rPr lang="fr-CH" smtClean="0"/>
+              <a:pPr/>
               <a:t>‹N°›</a:t>
             </a:fld>
             <a:endParaRPr lang="fr-CH"/>
@@ -576,6 +579,7 @@
           <a:p>
             <a:fld id="{1DCE5F11-534C-45A7-8A38-E52E47A254FF}" type="slidenum">
               <a:rPr lang="fr-CH" smtClean="0"/>
+              <a:pPr/>
               <a:t>3</a:t>
             </a:fld>
             <a:endParaRPr lang="fr-CH"/>
@@ -772,7 +776,7 @@
             <a:fld id="{AA309A6D-C09C-4548-B29A-6CF363A7E532}" type="datetimeFigureOut">
               <a:rPr lang="fr-FR" smtClean="0"/>
               <a:pPr/>
-              <a:t>24/01/2014</a:t>
+              <a:t>27/01/2014</a:t>
             </a:fld>
             <a:endParaRPr lang="fr-BE"/>
           </a:p>
@@ -939,7 +943,7 @@
             <a:fld id="{AA309A6D-C09C-4548-B29A-6CF363A7E532}" type="datetimeFigureOut">
               <a:rPr lang="fr-FR" smtClean="0"/>
               <a:pPr/>
-              <a:t>24/01/2014</a:t>
+              <a:t>27/01/2014</a:t>
             </a:fld>
             <a:endParaRPr lang="fr-BE"/>
           </a:p>
@@ -1116,7 +1120,7 @@
             <a:fld id="{AA309A6D-C09C-4548-B29A-6CF363A7E532}" type="datetimeFigureOut">
               <a:rPr lang="fr-FR" smtClean="0"/>
               <a:pPr/>
-              <a:t>24/01/2014</a:t>
+              <a:t>27/01/2014</a:t>
             </a:fld>
             <a:endParaRPr lang="fr-BE"/>
           </a:p>
@@ -1283,7 +1287,7 @@
             <a:fld id="{AA309A6D-C09C-4548-B29A-6CF363A7E532}" type="datetimeFigureOut">
               <a:rPr lang="fr-FR" smtClean="0"/>
               <a:pPr/>
-              <a:t>24/01/2014</a:t>
+              <a:t>27/01/2014</a:t>
             </a:fld>
             <a:endParaRPr lang="fr-BE"/>
           </a:p>
@@ -1526,7 +1530,7 @@
             <a:fld id="{AA309A6D-C09C-4548-B29A-6CF363A7E532}" type="datetimeFigureOut">
               <a:rPr lang="fr-FR" smtClean="0"/>
               <a:pPr/>
-              <a:t>24/01/2014</a:t>
+              <a:t>27/01/2014</a:t>
             </a:fld>
             <a:endParaRPr lang="fr-BE"/>
           </a:p>
@@ -1811,7 +1815,7 @@
             <a:fld id="{AA309A6D-C09C-4548-B29A-6CF363A7E532}" type="datetimeFigureOut">
               <a:rPr lang="fr-FR" smtClean="0"/>
               <a:pPr/>
-              <a:t>24/01/2014</a:t>
+              <a:t>27/01/2014</a:t>
             </a:fld>
             <a:endParaRPr lang="fr-BE"/>
           </a:p>
@@ -2230,7 +2234,7 @@
             <a:fld id="{AA309A6D-C09C-4548-B29A-6CF363A7E532}" type="datetimeFigureOut">
               <a:rPr lang="fr-FR" smtClean="0"/>
               <a:pPr/>
-              <a:t>24/01/2014</a:t>
+              <a:t>27/01/2014</a:t>
             </a:fld>
             <a:endParaRPr lang="fr-BE"/>
           </a:p>
@@ -2345,7 +2349,7 @@
             <a:fld id="{AA309A6D-C09C-4548-B29A-6CF363A7E532}" type="datetimeFigureOut">
               <a:rPr lang="fr-FR" smtClean="0"/>
               <a:pPr/>
-              <a:t>24/01/2014</a:t>
+              <a:t>27/01/2014</a:t>
             </a:fld>
             <a:endParaRPr lang="fr-BE"/>
           </a:p>
@@ -2437,7 +2441,7 @@
             <a:fld id="{AA309A6D-C09C-4548-B29A-6CF363A7E532}" type="datetimeFigureOut">
               <a:rPr lang="fr-FR" smtClean="0"/>
               <a:pPr/>
-              <a:t>24/01/2014</a:t>
+              <a:t>27/01/2014</a:t>
             </a:fld>
             <a:endParaRPr lang="fr-BE"/>
           </a:p>
@@ -2711,7 +2715,7 @@
             <a:fld id="{AA309A6D-C09C-4548-B29A-6CF363A7E532}" type="datetimeFigureOut">
               <a:rPr lang="fr-FR" smtClean="0"/>
               <a:pPr/>
-              <a:t>24/01/2014</a:t>
+              <a:t>27/01/2014</a:t>
             </a:fld>
             <a:endParaRPr lang="fr-BE"/>
           </a:p>
@@ -2961,7 +2965,7 @@
             <a:fld id="{AA309A6D-C09C-4548-B29A-6CF363A7E532}" type="datetimeFigureOut">
               <a:rPr lang="fr-FR" smtClean="0"/>
               <a:pPr/>
-              <a:t>24/01/2014</a:t>
+              <a:t>27/01/2014</a:t>
             </a:fld>
             <a:endParaRPr lang="fr-BE"/>
           </a:p>
@@ -3171,7 +3175,7 @@
             <a:fld id="{AA309A6D-C09C-4548-B29A-6CF363A7E532}" type="datetimeFigureOut">
               <a:rPr lang="fr-FR" smtClean="0"/>
               <a:pPr/>
-              <a:t>24/01/2014</a:t>
+              <a:t>27/01/2014</a:t>
             </a:fld>
             <a:endParaRPr lang="fr-BE"/>
           </a:p>
@@ -3582,11 +3586,7 @@
           <a:p>
             <a:r>
               <a:rPr lang="fr-CH" dirty="0" smtClean="0"/>
-              <a:t>1 </a:t>
-            </a:r>
-            <a:r>
-              <a:rPr lang="fr-CH" dirty="0" smtClean="0"/>
-              <a:t>– Méthodes et visibilité</a:t>
+              <a:t>1 – Méthodes et visibilité</a:t>
             </a:r>
             <a:endParaRPr lang="fr-CH" dirty="0"/>
           </a:p>
@@ -3666,14 +3666,12 @@
               <a:rPr lang="fr-CH" dirty="0" smtClean="0"/>
               <a:t>Méthodes dans le dernier compartiment</a:t>
             </a:r>
-            <a:endParaRPr lang="fr-CH" dirty="0" smtClean="0"/>
           </a:p>
           <a:p>
             <a:r>
               <a:rPr lang="fr-CH" dirty="0" smtClean="0"/>
               <a:t>Syntaxe UML: </a:t>
             </a:r>
-            <a:endParaRPr lang="fr-CH" dirty="0" smtClean="0"/>
           </a:p>
           <a:p>
             <a:r>
@@ -3701,11 +3699,7 @@
           <a:p>
             <a:r>
               <a:rPr lang="fr-CH" dirty="0" smtClean="0"/>
-              <a:t>Syntaxe JAVA</a:t>
-            </a:r>
-            <a:r>
-              <a:rPr lang="fr-CH" dirty="0" smtClean="0"/>
-              <a:t>:</a:t>
+              <a:t>Syntaxe JAVA:</a:t>
             </a:r>
           </a:p>
           <a:p>
@@ -3741,7 +3735,6 @@
               <a:rPr lang="fr-CH" i="1" dirty="0" smtClean="0"/>
               <a:t>, …)</a:t>
             </a:r>
-            <a:endParaRPr lang="fr-CH" i="1" dirty="0" smtClean="0"/>
           </a:p>
         </p:txBody>
       </p:sp>
@@ -3987,7 +3980,6 @@
               <a:rPr lang="fr-CH" dirty="0" smtClean="0"/>
               <a:t>« + » = « public »</a:t>
             </a:r>
-            <a:endParaRPr lang="fr-CH" dirty="0" smtClean="0"/>
           </a:p>
         </p:txBody>
       </p:sp>
@@ -4197,11 +4189,7 @@
             </a:pPr>
             <a:r>
               <a:rPr lang="fr-CH" sz="1400" i="1" dirty="0" smtClean="0"/>
-              <a:t>Voir exemple </a:t>
-            </a:r>
-            <a:r>
-              <a:rPr lang="fr-CH" sz="1400" i="1" dirty="0" smtClean="0"/>
-              <a:t>«dc_3»</a:t>
+              <a:t>Voir exemple «dc_3»</a:t>
             </a:r>
             <a:endParaRPr kumimoji="0" lang="fr-CH" sz="1400" b="0" i="1" u="none" strike="noStrike" kern="1200" cap="none" spc="0" normalizeH="0" baseline="0" noProof="0" dirty="0">
               <a:ln>
@@ -4355,9 +4343,144 @@
             </a:r>
             <a:r>
               <a:rPr lang="fr-CH" dirty="0" smtClean="0"/>
-              <a:t>():String</a:t>
+              <a:t>():</a:t>
+            </a:r>
+            <a:r>
+              <a:rPr lang="fr-CH" dirty="0" smtClean="0"/>
+              <a:t>String</a:t>
             </a:r>
             <a:endParaRPr lang="fr-CH" dirty="0" smtClean="0"/>
+          </a:p>
+          <a:p>
+            <a:r>
+              <a:rPr lang="fr-CH" dirty="0" smtClean="0"/>
+              <a:t>Créer une classe « ExerciceL2 » avec une méthode </a:t>
+            </a:r>
+            <a:r>
+              <a:rPr lang="fr-CH" i="1" dirty="0" smtClean="0"/>
+              <a:t>main </a:t>
+            </a:r>
+            <a:r>
+              <a:rPr lang="fr-CH" dirty="0" smtClean="0"/>
+              <a:t>qui teste vos classes</a:t>
+            </a:r>
+          </a:p>
+        </p:txBody>
+      </p:sp>
+    </p:spTree>
+  </p:cSld>
+  <p:clrMapOvr>
+    <a:masterClrMapping/>
+  </p:clrMapOvr>
+</p:sld>
+</file>
+
+<file path=ppt/slides/slide6.xml><?xml version="1.0" encoding="utf-8"?>
+<p:sld xmlns:a="http://schemas.openxmlformats.org/drawingml/2006/main" xmlns:r="http://schemas.openxmlformats.org/officeDocument/2006/relationships" xmlns:p="http://schemas.openxmlformats.org/presentationml/2006/main">
+  <p:cSld>
+    <p:spTree>
+      <p:nvGrpSpPr>
+        <p:cNvPr id="1" name=""/>
+        <p:cNvGrpSpPr/>
+        <p:nvPr/>
+      </p:nvGrpSpPr>
+      <p:grpSpPr>
+        <a:xfrm>
+          <a:off x="0" y="0"/>
+          <a:ext cx="0" cy="0"/>
+          <a:chOff x="0" y="0"/>
+          <a:chExt cx="0" cy="0"/>
+        </a:xfrm>
+      </p:grpSpPr>
+      <p:sp>
+        <p:nvSpPr>
+          <p:cNvPr id="2" name="Titre 1"/>
+          <p:cNvSpPr>
+            <a:spLocks noGrp="1"/>
+          </p:cNvSpPr>
+          <p:nvPr>
+            <p:ph type="title"/>
+          </p:nvPr>
+        </p:nvSpPr>
+        <p:spPr/>
+        <p:txBody>
+          <a:bodyPr/>
+          <a:lstStyle/>
+          <a:p>
+            <a:r>
+              <a:rPr lang="fr-CH" dirty="0" smtClean="0"/>
+              <a:t>Exercice 2</a:t>
+            </a:r>
+            <a:endParaRPr lang="fr-CH" dirty="0"/>
+          </a:p>
+        </p:txBody>
+      </p:sp>
+      <p:sp>
+        <p:nvSpPr>
+          <p:cNvPr id="3" name="Espace réservé du contenu 2"/>
+          <p:cNvSpPr>
+            <a:spLocks noGrp="1"/>
+          </p:cNvSpPr>
+          <p:nvPr>
+            <p:ph idx="1"/>
+          </p:nvPr>
+        </p:nvSpPr>
+        <p:spPr/>
+        <p:txBody>
+          <a:bodyPr/>
+          <a:lstStyle/>
+          <a:p>
+            <a:r>
+              <a:rPr lang="fr-CH" dirty="0" smtClean="0"/>
+              <a:t>Depuis la classe ExerciceL2, vérifier l’impact des « </a:t>
+            </a:r>
+            <a:r>
+              <a:rPr lang="fr-CH" dirty="0" err="1" smtClean="0"/>
+              <a:t>access</a:t>
+            </a:r>
+            <a:r>
+              <a:rPr lang="fr-CH" dirty="0" smtClean="0"/>
+              <a:t> </a:t>
+            </a:r>
+            <a:r>
+              <a:rPr lang="fr-CH" dirty="0" err="1" smtClean="0"/>
+              <a:t>modifiers</a:t>
+            </a:r>
+            <a:r>
+              <a:rPr lang="fr-CH" dirty="0" smtClean="0"/>
+              <a:t> » sur </a:t>
+            </a:r>
+            <a:r>
+              <a:rPr lang="fr-CH" smtClean="0"/>
+              <a:t>la compilation:</a:t>
+            </a:r>
+            <a:endParaRPr lang="fr-CH" dirty="0" smtClean="0"/>
+          </a:p>
+          <a:p>
+            <a:pPr lvl="1"/>
+            <a:r>
+              <a:rPr lang="fr-CH" dirty="0" smtClean="0"/>
+              <a:t>Si les attributs sont privés, arrivez-vous à les modifier depuis ExerciceL2? S’ils sont public? « package </a:t>
+            </a:r>
+            <a:r>
+              <a:rPr lang="fr-CH" dirty="0" err="1" smtClean="0"/>
+              <a:t>private</a:t>
+            </a:r>
+            <a:r>
+              <a:rPr lang="fr-CH" dirty="0" smtClean="0"/>
+              <a:t> » (état par défaut)?</a:t>
+            </a:r>
+          </a:p>
+          <a:p>
+            <a:pPr lvl="1"/>
+            <a:r>
+              <a:rPr lang="fr-CH" dirty="0" smtClean="0"/>
+              <a:t>A la fin, tous vos attributs doivent être privés, et les accesseurs publics</a:t>
+            </a:r>
+          </a:p>
+          <a:p>
+            <a:pPr lvl="1"/>
+            <a:endParaRPr lang="fr-CH" dirty="0"/>
           </a:p>
         </p:txBody>
       </p:sp>

</xml_diff>